<commit_message>
adding readme file and some change to Powerpoint slids
</commit_message>
<xml_diff>
--- a/Presentation-Slides/Stop and Shop.pptx
+++ b/Presentation-Slides/Stop and Shop.pptx
@@ -110,6 +110,11 @@
       </a:defRPr>
     </a:lvl9pPr>
   </p:defaultTextStyle>
+  <p:extLst>
+    <p:ext uri="{EFAFB233-063F-42B5-8137-9DF3F51BA10A}">
+      <p15:sldGuideLst xmlns:p15="http://schemas.microsoft.com/office/powerpoint/2012/main"/>
+    </p:ext>
+  </p:extLst>
 </p:presentation>
 </file>
 
@@ -208,7 +213,7 @@
           <a:effectLst/>
           <a:extLst>
             <a:ext uri="{91240B29-F687-4f45-9708-019B960494DF}">
-              <a14:hiddenLine xmlns:a14="http://schemas.microsoft.com/office/drawing/2010/main" xmlns="" w="9525">
+              <a14:hiddenLine xmlns="" xmlns:a14="http://schemas.microsoft.com/office/drawing/2010/main" w="9525">
                 <a:solidFill>
                   <a:srgbClr val="000000"/>
                 </a:solidFill>
@@ -401,7 +406,7 @@
             <a:fld id="{08B9EBBA-996F-894A-B54A-D6246ED52CEA}" type="datetimeFigureOut">
               <a:rPr lang="en-US" dirty="0"/>
               <a:pPr/>
-              <a:t>3/20/2020</a:t>
+              <a:t>3/27/2020</a:t>
             </a:fld>
             <a:endParaRPr lang="en-US" dirty="0"/>
           </a:p>
@@ -716,7 +721,7 @@
             <a:fld id="{18C79C5D-2A6F-F04D-97DA-BEF2467B64E4}" type="datetimeFigureOut">
               <a:rPr lang="en-US" dirty="0"/>
               <a:pPr/>
-              <a:t>3/20/2020</a:t>
+              <a:t>3/27/2020</a:t>
             </a:fld>
             <a:endParaRPr lang="en-US" dirty="0"/>
           </a:p>
@@ -1201,7 +1206,7 @@
             <a:fld id="{8DFA1846-DA80-1C48-A609-854EA85C59AD}" type="datetimeFigureOut">
               <a:rPr lang="en-US" dirty="0"/>
               <a:pPr/>
-              <a:t>3/20/2020</a:t>
+              <a:t>3/27/2020</a:t>
             </a:fld>
             <a:endParaRPr lang="en-US" dirty="0"/>
           </a:p>
@@ -1567,7 +1572,7 @@
             <a:fld id="{FBF54567-0DE4-3F47-BF90-CB84690072F9}" type="datetimeFigureOut">
               <a:rPr lang="en-US" dirty="0"/>
               <a:pPr/>
-              <a:t>3/20/2020</a:t>
+              <a:t>3/27/2020</a:t>
             </a:fld>
             <a:endParaRPr lang="en-US" dirty="0"/>
           </a:p>
@@ -1718,7 +1723,7 @@
           <a:ln/>
           <a:extLst>
             <a:ext uri="{91240B29-F687-4f45-9708-019B960494DF}">
-              <a14:hiddenLine xmlns:a14="http://schemas.microsoft.com/office/drawing/2010/main" xmlns="" w="9525">
+              <a14:hiddenLine xmlns="" xmlns:a14="http://schemas.microsoft.com/office/drawing/2010/main" w="9525">
                 <a:solidFill>
                   <a:srgbClr val="000000"/>
                 </a:solidFill>
@@ -1837,7 +1842,7 @@
             <a:fld id="{C6C52C72-DE31-F449-A4ED-4C594FD91407}" type="datetimeFigureOut">
               <a:rPr lang="en-US" dirty="0"/>
               <a:pPr/>
-              <a:t>3/20/2020</a:t>
+              <a:t>3/27/2020</a:t>
             </a:fld>
             <a:endParaRPr lang="en-US" dirty="0"/>
           </a:p>
@@ -1990,7 +1995,7 @@
           <a:ln/>
           <a:extLst>
             <a:ext uri="{91240B29-F687-4f45-9708-019B960494DF}">
-              <a14:hiddenLine xmlns:a14="http://schemas.microsoft.com/office/drawing/2010/main" xmlns="" w="9525">
+              <a14:hiddenLine xmlns="" xmlns:a14="http://schemas.microsoft.com/office/drawing/2010/main" w="9525">
                 <a:solidFill>
                   <a:srgbClr val="000000"/>
                 </a:solidFill>
@@ -2119,7 +2124,7 @@
             <a:fld id="{ED62726E-379B-B349-9EED-81ED093FA806}" type="datetimeFigureOut">
               <a:rPr lang="en-US" dirty="0"/>
               <a:pPr/>
-              <a:t>3/20/2020</a:t>
+              <a:t>3/27/2020</a:t>
             </a:fld>
             <a:endParaRPr lang="en-US" dirty="0"/>
           </a:p>
@@ -2270,7 +2275,7 @@
           <a:ln/>
           <a:extLst>
             <a:ext uri="{91240B29-F687-4f45-9708-019B960494DF}">
-              <a14:hiddenLine xmlns:a14="http://schemas.microsoft.com/office/drawing/2010/main" xmlns="" w="9525">
+              <a14:hiddenLine xmlns="" xmlns:a14="http://schemas.microsoft.com/office/drawing/2010/main" w="9525">
                 <a:solidFill>
                   <a:srgbClr val="000000"/>
                 </a:solidFill>
@@ -2399,7 +2404,7 @@
             <a:fld id="{9B3A1323-8D79-1946-B0D7-40001CF92E9D}" type="datetimeFigureOut">
               <a:rPr lang="en-US" dirty="0"/>
               <a:pPr/>
-              <a:t>3/20/2020</a:t>
+              <a:t>3/27/2020</a:t>
             </a:fld>
             <a:endParaRPr lang="en-US" dirty="0"/>
           </a:p>
@@ -2739,7 +2744,7 @@
             <a:fld id="{8DFA1846-DA80-1C48-A609-854EA85C59AD}" type="datetimeFigureOut">
               <a:rPr lang="en-US" dirty="0"/>
               <a:pPr/>
-              <a:t>3/20/2020</a:t>
+              <a:t>3/27/2020</a:t>
             </a:fld>
             <a:endParaRPr lang="en-US" dirty="0"/>
           </a:p>
@@ -2890,7 +2895,7 @@
           <a:ln/>
           <a:extLst>
             <a:ext uri="{91240B29-F687-4f45-9708-019B960494DF}">
-              <a14:hiddenLine xmlns:a14="http://schemas.microsoft.com/office/drawing/2010/main" xmlns="" w="9525">
+              <a14:hiddenLine xmlns="" xmlns:a14="http://schemas.microsoft.com/office/drawing/2010/main" w="9525">
                 <a:solidFill>
                   <a:srgbClr val="000000"/>
                 </a:solidFill>
@@ -3075,7 +3080,7 @@
             <a:fld id="{57302355-E14B-8545-A8F8-0FE83CC9D524}" type="datetimeFigureOut">
               <a:rPr lang="en-US" dirty="0"/>
               <a:pPr/>
-              <a:t>3/20/2020</a:t>
+              <a:t>3/27/2020</a:t>
             </a:fld>
             <a:endParaRPr lang="en-US" dirty="0"/>
           </a:p>
@@ -3226,7 +3231,7 @@
           <a:ln/>
           <a:extLst>
             <a:ext uri="{91240B29-F687-4f45-9708-019B960494DF}">
-              <a14:hiddenLine xmlns:a14="http://schemas.microsoft.com/office/drawing/2010/main" xmlns="" w="9525">
+              <a14:hiddenLine xmlns="" xmlns:a14="http://schemas.microsoft.com/office/drawing/2010/main" w="9525">
                 <a:solidFill>
                   <a:srgbClr val="000000"/>
                 </a:solidFill>
@@ -3549,7 +3554,7 @@
             <a:fld id="{02640F58-564D-2B4F-AE67-E407BA4FCF45}" type="datetimeFigureOut">
               <a:rPr lang="en-US" dirty="0"/>
               <a:pPr/>
-              <a:t>3/20/2020</a:t>
+              <a:t>3/27/2020</a:t>
             </a:fld>
             <a:endParaRPr lang="en-US" dirty="0"/>
           </a:p>
@@ -3700,7 +3705,7 @@
           <a:ln/>
           <a:extLst>
             <a:ext uri="{91240B29-F687-4f45-9708-019B960494DF}">
-              <a14:hiddenLine xmlns:a14="http://schemas.microsoft.com/office/drawing/2010/main" xmlns="" w="9525">
+              <a14:hiddenLine xmlns="" xmlns:a14="http://schemas.microsoft.com/office/drawing/2010/main" w="9525">
                 <a:solidFill>
                   <a:srgbClr val="000000"/>
                 </a:solidFill>
@@ -3767,7 +3772,7 @@
             <a:fld id="{F13A34C8-038E-2045-AF43-DF7DBB8E0E9E}" type="datetimeFigureOut">
               <a:rPr lang="en-US" dirty="0"/>
               <a:pPr/>
-              <a:t>3/20/2020</a:t>
+              <a:t>3/27/2020</a:t>
             </a:fld>
             <a:endParaRPr lang="en-US" dirty="0"/>
           </a:p>
@@ -3859,7 +3864,7 @@
             <a:fld id="{8818C68F-D26B-8F47-958C-23B49CF8A634}" type="datetimeFigureOut">
               <a:rPr lang="en-US" dirty="0"/>
               <a:pPr/>
-              <a:t>3/20/2020</a:t>
+              <a:t>3/27/2020</a:t>
             </a:fld>
             <a:endParaRPr lang="en-US" dirty="0"/>
           </a:p>
@@ -4123,7 +4128,7 @@
           <a:ln/>
           <a:extLst>
             <a:ext uri="{91240B29-F687-4f45-9708-019B960494DF}">
-              <a14:hiddenLine xmlns:a14="http://schemas.microsoft.com/office/drawing/2010/main" xmlns="" w="9525">
+              <a14:hiddenLine xmlns="" xmlns:a14="http://schemas.microsoft.com/office/drawing/2010/main" w="9525">
                 <a:solidFill>
                   <a:srgbClr val="000000"/>
                 </a:solidFill>
@@ -4323,7 +4328,7 @@
             <a:fld id="{D0DF5E60-9974-AC48-9591-99C2BB44B7CF}" type="datetimeFigureOut">
               <a:rPr lang="en-US" dirty="0"/>
               <a:pPr/>
-              <a:t>3/20/2020</a:t>
+              <a:t>3/27/2020</a:t>
             </a:fld>
             <a:endParaRPr lang="en-US" dirty="0"/>
           </a:p>
@@ -4633,7 +4638,7 @@
             <a:fld id="{18C79C5D-2A6F-F04D-97DA-BEF2467B64E4}" type="datetimeFigureOut">
               <a:rPr lang="en-US" dirty="0"/>
               <a:pPr/>
-              <a:t>3/20/2020</a:t>
+              <a:t>3/27/2020</a:t>
             </a:fld>
             <a:endParaRPr lang="en-US" dirty="0"/>
           </a:p>
@@ -4900,7 +4905,7 @@
             <a:fld id="{09B482E8-6E0E-1B4F-B1FD-C69DB9E858D9}" type="datetimeFigureOut">
               <a:rPr lang="en-US" dirty="0"/>
               <a:pPr/>
-              <a:t>3/20/2020</a:t>
+              <a:t>3/27/2020</a:t>
             </a:fld>
             <a:endParaRPr lang="en-US" dirty="0"/>
           </a:p>
@@ -5593,7 +5598,7 @@
         </p:spPr>
         <p:txBody>
           <a:bodyPr>
-            <a:normAutofit fontScale="92500" lnSpcReduction="10000"/>
+            <a:normAutofit lnSpcReduction="10000"/>
           </a:bodyPr>
           <a:lstStyle/>
           <a:p>
@@ -5671,7 +5676,7 @@
             </a:pPr>
             <a:r>
               <a:rPr lang="en-US" dirty="0"/>
-              <a:t>	As a developer who wants to learn more JavaScript I can buy a book online without leaving 	my home</a:t>
+              <a:t>	As a human with internet connection who doesn’t want to get the corona virus I can buy 	what I want online without leaving my home</a:t>
             </a:r>
           </a:p>
         </p:txBody>
@@ -5840,7 +5845,15 @@
             </a:pPr>
             <a:r>
               <a:rPr lang="en-US" dirty="0"/>
-              <a:t>	Figured out put admin permissions on certain pages of the website and changing how the 	website looks based on who is logged in.</a:t>
+              <a:t>	Figured out hot to put admin permissions on certain pages of the website and how to </a:t>
+            </a:r>
+            <a:r>
+              <a:rPr lang="en-US"/>
+              <a:t>change 	the website </a:t>
+            </a:r>
+            <a:r>
+              <a:rPr lang="en-US" dirty="0"/>
+              <a:t>based on who is logged in.</a:t>
             </a:r>
           </a:p>
         </p:txBody>

</xml_diff>

<commit_message>
clear extra comments and change to the powerpoint
</commit_message>
<xml_diff>
--- a/Presentation-Slides/Stop and Shop.pptx
+++ b/Presentation-Slides/Stop and Shop.pptx
@@ -213,7 +213,7 @@
           <a:effectLst/>
           <a:extLst>
             <a:ext uri="{91240B29-F687-4f45-9708-019B960494DF}">
-              <a14:hiddenLine xmlns="" xmlns:a14="http://schemas.microsoft.com/office/drawing/2010/main" w="9525">
+              <a14:hiddenLine xmlns:a14="http://schemas.microsoft.com/office/drawing/2010/main" xmlns="" w="9525">
                 <a:solidFill>
                   <a:srgbClr val="000000"/>
                 </a:solidFill>
@@ -406,7 +406,7 @@
             <a:fld id="{08B9EBBA-996F-894A-B54A-D6246ED52CEA}" type="datetimeFigureOut">
               <a:rPr lang="en-US" dirty="0"/>
               <a:pPr/>
-              <a:t>3/27/2020</a:t>
+              <a:t>3/28/2020</a:t>
             </a:fld>
             <a:endParaRPr lang="en-US" dirty="0"/>
           </a:p>
@@ -721,7 +721,7 @@
             <a:fld id="{18C79C5D-2A6F-F04D-97DA-BEF2467B64E4}" type="datetimeFigureOut">
               <a:rPr lang="en-US" dirty="0"/>
               <a:pPr/>
-              <a:t>3/27/2020</a:t>
+              <a:t>3/28/2020</a:t>
             </a:fld>
             <a:endParaRPr lang="en-US" dirty="0"/>
           </a:p>
@@ -1206,7 +1206,7 @@
             <a:fld id="{8DFA1846-DA80-1C48-A609-854EA85C59AD}" type="datetimeFigureOut">
               <a:rPr lang="en-US" dirty="0"/>
               <a:pPr/>
-              <a:t>3/27/2020</a:t>
+              <a:t>3/28/2020</a:t>
             </a:fld>
             <a:endParaRPr lang="en-US" dirty="0"/>
           </a:p>
@@ -1572,7 +1572,7 @@
             <a:fld id="{FBF54567-0DE4-3F47-BF90-CB84690072F9}" type="datetimeFigureOut">
               <a:rPr lang="en-US" dirty="0"/>
               <a:pPr/>
-              <a:t>3/27/2020</a:t>
+              <a:t>3/28/2020</a:t>
             </a:fld>
             <a:endParaRPr lang="en-US" dirty="0"/>
           </a:p>
@@ -1723,7 +1723,7 @@
           <a:ln/>
           <a:extLst>
             <a:ext uri="{91240B29-F687-4f45-9708-019B960494DF}">
-              <a14:hiddenLine xmlns="" xmlns:a14="http://schemas.microsoft.com/office/drawing/2010/main" w="9525">
+              <a14:hiddenLine xmlns:a14="http://schemas.microsoft.com/office/drawing/2010/main" xmlns="" w="9525">
                 <a:solidFill>
                   <a:srgbClr val="000000"/>
                 </a:solidFill>
@@ -1842,7 +1842,7 @@
             <a:fld id="{C6C52C72-DE31-F449-A4ED-4C594FD91407}" type="datetimeFigureOut">
               <a:rPr lang="en-US" dirty="0"/>
               <a:pPr/>
-              <a:t>3/27/2020</a:t>
+              <a:t>3/28/2020</a:t>
             </a:fld>
             <a:endParaRPr lang="en-US" dirty="0"/>
           </a:p>
@@ -1995,7 +1995,7 @@
           <a:ln/>
           <a:extLst>
             <a:ext uri="{91240B29-F687-4f45-9708-019B960494DF}">
-              <a14:hiddenLine xmlns="" xmlns:a14="http://schemas.microsoft.com/office/drawing/2010/main" w="9525">
+              <a14:hiddenLine xmlns:a14="http://schemas.microsoft.com/office/drawing/2010/main" xmlns="" w="9525">
                 <a:solidFill>
                   <a:srgbClr val="000000"/>
                 </a:solidFill>
@@ -2124,7 +2124,7 @@
             <a:fld id="{ED62726E-379B-B349-9EED-81ED093FA806}" type="datetimeFigureOut">
               <a:rPr lang="en-US" dirty="0"/>
               <a:pPr/>
-              <a:t>3/27/2020</a:t>
+              <a:t>3/28/2020</a:t>
             </a:fld>
             <a:endParaRPr lang="en-US" dirty="0"/>
           </a:p>
@@ -2275,7 +2275,7 @@
           <a:ln/>
           <a:extLst>
             <a:ext uri="{91240B29-F687-4f45-9708-019B960494DF}">
-              <a14:hiddenLine xmlns="" xmlns:a14="http://schemas.microsoft.com/office/drawing/2010/main" w="9525">
+              <a14:hiddenLine xmlns:a14="http://schemas.microsoft.com/office/drawing/2010/main" xmlns="" w="9525">
                 <a:solidFill>
                   <a:srgbClr val="000000"/>
                 </a:solidFill>
@@ -2404,7 +2404,7 @@
             <a:fld id="{9B3A1323-8D79-1946-B0D7-40001CF92E9D}" type="datetimeFigureOut">
               <a:rPr lang="en-US" dirty="0"/>
               <a:pPr/>
-              <a:t>3/27/2020</a:t>
+              <a:t>3/28/2020</a:t>
             </a:fld>
             <a:endParaRPr lang="en-US" dirty="0"/>
           </a:p>
@@ -2744,7 +2744,7 @@
             <a:fld id="{8DFA1846-DA80-1C48-A609-854EA85C59AD}" type="datetimeFigureOut">
               <a:rPr lang="en-US" dirty="0"/>
               <a:pPr/>
-              <a:t>3/27/2020</a:t>
+              <a:t>3/28/2020</a:t>
             </a:fld>
             <a:endParaRPr lang="en-US" dirty="0"/>
           </a:p>
@@ -2895,7 +2895,7 @@
           <a:ln/>
           <a:extLst>
             <a:ext uri="{91240B29-F687-4f45-9708-019B960494DF}">
-              <a14:hiddenLine xmlns="" xmlns:a14="http://schemas.microsoft.com/office/drawing/2010/main" w="9525">
+              <a14:hiddenLine xmlns:a14="http://schemas.microsoft.com/office/drawing/2010/main" xmlns="" w="9525">
                 <a:solidFill>
                   <a:srgbClr val="000000"/>
                 </a:solidFill>
@@ -3080,7 +3080,7 @@
             <a:fld id="{57302355-E14B-8545-A8F8-0FE83CC9D524}" type="datetimeFigureOut">
               <a:rPr lang="en-US" dirty="0"/>
               <a:pPr/>
-              <a:t>3/27/2020</a:t>
+              <a:t>3/28/2020</a:t>
             </a:fld>
             <a:endParaRPr lang="en-US" dirty="0"/>
           </a:p>
@@ -3231,7 +3231,7 @@
           <a:ln/>
           <a:extLst>
             <a:ext uri="{91240B29-F687-4f45-9708-019B960494DF}">
-              <a14:hiddenLine xmlns="" xmlns:a14="http://schemas.microsoft.com/office/drawing/2010/main" w="9525">
+              <a14:hiddenLine xmlns:a14="http://schemas.microsoft.com/office/drawing/2010/main" xmlns="" w="9525">
                 <a:solidFill>
                   <a:srgbClr val="000000"/>
                 </a:solidFill>
@@ -3554,7 +3554,7 @@
             <a:fld id="{02640F58-564D-2B4F-AE67-E407BA4FCF45}" type="datetimeFigureOut">
               <a:rPr lang="en-US" dirty="0"/>
               <a:pPr/>
-              <a:t>3/27/2020</a:t>
+              <a:t>3/28/2020</a:t>
             </a:fld>
             <a:endParaRPr lang="en-US" dirty="0"/>
           </a:p>
@@ -3705,7 +3705,7 @@
           <a:ln/>
           <a:extLst>
             <a:ext uri="{91240B29-F687-4f45-9708-019B960494DF}">
-              <a14:hiddenLine xmlns="" xmlns:a14="http://schemas.microsoft.com/office/drawing/2010/main" w="9525">
+              <a14:hiddenLine xmlns:a14="http://schemas.microsoft.com/office/drawing/2010/main" xmlns="" w="9525">
                 <a:solidFill>
                   <a:srgbClr val="000000"/>
                 </a:solidFill>
@@ -3772,7 +3772,7 @@
             <a:fld id="{F13A34C8-038E-2045-AF43-DF7DBB8E0E9E}" type="datetimeFigureOut">
               <a:rPr lang="en-US" dirty="0"/>
               <a:pPr/>
-              <a:t>3/27/2020</a:t>
+              <a:t>3/28/2020</a:t>
             </a:fld>
             <a:endParaRPr lang="en-US" dirty="0"/>
           </a:p>
@@ -3864,7 +3864,7 @@
             <a:fld id="{8818C68F-D26B-8F47-958C-23B49CF8A634}" type="datetimeFigureOut">
               <a:rPr lang="en-US" dirty="0"/>
               <a:pPr/>
-              <a:t>3/27/2020</a:t>
+              <a:t>3/28/2020</a:t>
             </a:fld>
             <a:endParaRPr lang="en-US" dirty="0"/>
           </a:p>
@@ -4128,7 +4128,7 @@
           <a:ln/>
           <a:extLst>
             <a:ext uri="{91240B29-F687-4f45-9708-019B960494DF}">
-              <a14:hiddenLine xmlns="" xmlns:a14="http://schemas.microsoft.com/office/drawing/2010/main" w="9525">
+              <a14:hiddenLine xmlns:a14="http://schemas.microsoft.com/office/drawing/2010/main" xmlns="" w="9525">
                 <a:solidFill>
                   <a:srgbClr val="000000"/>
                 </a:solidFill>
@@ -4328,7 +4328,7 @@
             <a:fld id="{D0DF5E60-9974-AC48-9591-99C2BB44B7CF}" type="datetimeFigureOut">
               <a:rPr lang="en-US" dirty="0"/>
               <a:pPr/>
-              <a:t>3/27/2020</a:t>
+              <a:t>3/28/2020</a:t>
             </a:fld>
             <a:endParaRPr lang="en-US" dirty="0"/>
           </a:p>
@@ -4638,7 +4638,7 @@
             <a:fld id="{18C79C5D-2A6F-F04D-97DA-BEF2467B64E4}" type="datetimeFigureOut">
               <a:rPr lang="en-US" dirty="0"/>
               <a:pPr/>
-              <a:t>3/27/2020</a:t>
+              <a:t>3/28/2020</a:t>
             </a:fld>
             <a:endParaRPr lang="en-US" dirty="0"/>
           </a:p>
@@ -4905,7 +4905,7 @@
             <a:fld id="{09B482E8-6E0E-1B4F-B1FD-C69DB9E858D9}" type="datetimeFigureOut">
               <a:rPr lang="en-US" dirty="0"/>
               <a:pPr/>
-              <a:t>3/27/2020</a:t>
+              <a:t>3/28/2020</a:t>
             </a:fld>
             <a:endParaRPr lang="en-US" dirty="0"/>
           </a:p>
@@ -5614,7 +5614,7 @@
             </a:pPr>
             <a:r>
               <a:rPr lang="en-US" dirty="0"/>
-              <a:t>	Our site allows clients to put items into an online shopping cart and then proceed to a 	checkout with those items.</a:t>
+              <a:t>	Our application allows clients to put items into an online shopping cart and then proceed  	to a checkout with those items.</a:t>
             </a:r>
           </a:p>
           <a:p>
@@ -5845,15 +5845,7 @@
             </a:pPr>
             <a:r>
               <a:rPr lang="en-US" dirty="0"/>
-              <a:t>	Figured out hot to put admin permissions on certain pages of the website and how to </a:t>
-            </a:r>
-            <a:r>
-              <a:rPr lang="en-US"/>
-              <a:t>change 	the website </a:t>
-            </a:r>
-            <a:r>
-              <a:rPr lang="en-US" dirty="0"/>
-              <a:t>based on who is logged in.</a:t>
+              <a:t>	Figured out how to put admin permissions on certain pages of the website and how to 	change 	the website based on who is logged in.</a:t>
             </a:r>
           </a:p>
         </p:txBody>

</xml_diff>

<commit_message>
change to the powepoint slids
</commit_message>
<xml_diff>
--- a/Presentation-Slides/Stop and Shop.pptx
+++ b/Presentation-Slides/Stop and Shop.pptx
@@ -5934,6 +5934,31 @@
               <a:t>Let’s do a quick demo!</a:t>
             </a:r>
           </a:p>
+          <a:p>
+            <a:pPr marL="0" indent="0">
+              <a:buNone/>
+            </a:pPr>
+            <a:r>
+              <a:rPr lang="en-US" dirty="0"/>
+              <a:t>      </a:t>
+            </a:r>
+            <a:r>
+              <a:rPr lang="en-US" dirty="0">
+                <a:hlinkClick r:id="rId2"/>
+              </a:rPr>
+              <a:t>https://stop-and-shop-2020.herokuapp.com/</a:t>
+            </a:r>
+            <a:endParaRPr lang="en-US" dirty="0"/>
+          </a:p>
+          <a:p>
+            <a:pPr marL="0" indent="0">
+              <a:buNone/>
+            </a:pPr>
+            <a:r>
+              <a:rPr lang="en-US" dirty="0"/>
+              <a:t>   </a:t>
+            </a:r>
+          </a:p>
         </p:txBody>
       </p:sp>
     </p:spTree>
@@ -6017,7 +6042,7 @@
           <a:p>
             <a:r>
               <a:rPr lang="en-US" dirty="0"/>
-              <a:t>Allow admin to upload an image for the product they are creating.</a:t>
+              <a:t>Allow admin to upload an image for the product they are creating</a:t>
             </a:r>
           </a:p>
           <a:p>
@@ -6043,6 +6068,21 @@
               <a:rPr lang="en-US" dirty="0"/>
               <a:t>Delivery Options (we just keep the money right now)</a:t>
             </a:r>
+          </a:p>
+          <a:p>
+            <a:r>
+              <a:rPr lang="en-US" dirty="0"/>
+              <a:t>The items added have a quantity that represents the supply. The supply goes down when there are purchase</a:t>
+            </a:r>
+          </a:p>
+          <a:p>
+            <a:r>
+              <a:rPr lang="en-US" dirty="0"/>
+              <a:t>The checkout cart page should allow users to change the items that they want to purchase.</a:t>
+            </a:r>
+          </a:p>
+          <a:p>
+            <a:endParaRPr lang="en-US" dirty="0"/>
           </a:p>
         </p:txBody>
       </p:sp>

</xml_diff>